<commit_message>
Beginnetje gemaakt met huiswerk1
</commit_message>
<xml_diff>
--- a/Introductie tot programmeren - Dag 1.pptx
+++ b/Introductie tot programmeren - Dag 1.pptx
@@ -298,7 +298,7 @@
           <a:p>
             <a:fld id="{3CA286B2-925C-4C0F-899F-04244A2F62B2}" type="datetimeFigureOut">
               <a:rPr lang="nl-NL" smtClean="0"/>
-              <a:t>27-3-2023</a:t>
+              <a:t>13-4-2023</a:t>
             </a:fld>
             <a:endParaRPr lang="nl-NL"/>
           </a:p>
@@ -496,7 +496,7 @@
           <a:p>
             <a:fld id="{3CA286B2-925C-4C0F-899F-04244A2F62B2}" type="datetimeFigureOut">
               <a:rPr lang="nl-NL" smtClean="0"/>
-              <a:t>27-3-2023</a:t>
+              <a:t>13-4-2023</a:t>
             </a:fld>
             <a:endParaRPr lang="nl-NL"/>
           </a:p>
@@ -704,7 +704,7 @@
           <a:p>
             <a:fld id="{3CA286B2-925C-4C0F-899F-04244A2F62B2}" type="datetimeFigureOut">
               <a:rPr lang="nl-NL" smtClean="0"/>
-              <a:t>27-3-2023</a:t>
+              <a:t>13-4-2023</a:t>
             </a:fld>
             <a:endParaRPr lang="nl-NL"/>
           </a:p>
@@ -902,7 +902,7 @@
           <a:p>
             <a:fld id="{3CA286B2-925C-4C0F-899F-04244A2F62B2}" type="datetimeFigureOut">
               <a:rPr lang="nl-NL" smtClean="0"/>
-              <a:t>27-3-2023</a:t>
+              <a:t>13-4-2023</a:t>
             </a:fld>
             <a:endParaRPr lang="nl-NL"/>
           </a:p>
@@ -1177,7 +1177,7 @@
           <a:p>
             <a:fld id="{3CA286B2-925C-4C0F-899F-04244A2F62B2}" type="datetimeFigureOut">
               <a:rPr lang="nl-NL" smtClean="0"/>
-              <a:t>27-3-2023</a:t>
+              <a:t>13-4-2023</a:t>
             </a:fld>
             <a:endParaRPr lang="nl-NL"/>
           </a:p>
@@ -1442,7 +1442,7 @@
           <a:p>
             <a:fld id="{3CA286B2-925C-4C0F-899F-04244A2F62B2}" type="datetimeFigureOut">
               <a:rPr lang="nl-NL" smtClean="0"/>
-              <a:t>27-3-2023</a:t>
+              <a:t>13-4-2023</a:t>
             </a:fld>
             <a:endParaRPr lang="nl-NL"/>
           </a:p>
@@ -1854,7 +1854,7 @@
           <a:p>
             <a:fld id="{3CA286B2-925C-4C0F-899F-04244A2F62B2}" type="datetimeFigureOut">
               <a:rPr lang="nl-NL" smtClean="0"/>
-              <a:t>27-3-2023</a:t>
+              <a:t>13-4-2023</a:t>
             </a:fld>
             <a:endParaRPr lang="nl-NL"/>
           </a:p>
@@ -1995,7 +1995,7 @@
           <a:p>
             <a:fld id="{3CA286B2-925C-4C0F-899F-04244A2F62B2}" type="datetimeFigureOut">
               <a:rPr lang="nl-NL" smtClean="0"/>
-              <a:t>27-3-2023</a:t>
+              <a:t>13-4-2023</a:t>
             </a:fld>
             <a:endParaRPr lang="nl-NL"/>
           </a:p>
@@ -2108,7 +2108,7 @@
           <a:p>
             <a:fld id="{3CA286B2-925C-4C0F-899F-04244A2F62B2}" type="datetimeFigureOut">
               <a:rPr lang="nl-NL" smtClean="0"/>
-              <a:t>27-3-2023</a:t>
+              <a:t>13-4-2023</a:t>
             </a:fld>
             <a:endParaRPr lang="nl-NL"/>
           </a:p>
@@ -2419,7 +2419,7 @@
           <a:p>
             <a:fld id="{3CA286B2-925C-4C0F-899F-04244A2F62B2}" type="datetimeFigureOut">
               <a:rPr lang="nl-NL" smtClean="0"/>
-              <a:t>27-3-2023</a:t>
+              <a:t>13-4-2023</a:t>
             </a:fld>
             <a:endParaRPr lang="nl-NL"/>
           </a:p>
@@ -2707,7 +2707,7 @@
           <a:p>
             <a:fld id="{3CA286B2-925C-4C0F-899F-04244A2F62B2}" type="datetimeFigureOut">
               <a:rPr lang="nl-NL" smtClean="0"/>
-              <a:t>27-3-2023</a:t>
+              <a:t>13-4-2023</a:t>
             </a:fld>
             <a:endParaRPr lang="nl-NL"/>
           </a:p>
@@ -2948,7 +2948,7 @@
           <a:p>
             <a:fld id="{3CA286B2-925C-4C0F-899F-04244A2F62B2}" type="datetimeFigureOut">
               <a:rPr lang="nl-NL" smtClean="0"/>
-              <a:t>27-3-2023</a:t>
+              <a:t>13-4-2023</a:t>
             </a:fld>
             <a:endParaRPr lang="nl-NL"/>
           </a:p>
@@ -4233,6 +4233,15 @@
               </a:rPr>
               <a:t>Programmeermethoden (leidenuniv.nl)</a:t>
             </a:r>
+            <a:endParaRPr lang="nl-NL" dirty="0"/>
+          </a:p>
+          <a:p>
+            <a:r>
+              <a:rPr lang="nl-NL" dirty="0"/>
+              <a:t>Elkaar nakijken (schema volgt nog).</a:t>
+            </a:r>
+          </a:p>
+          <a:p>
             <a:endParaRPr lang="nl-NL" dirty="0"/>
           </a:p>
           <a:p>

</xml_diff>